<commit_message>
Added new slide with MVC pattern to patterns.pptx
</commit_message>
<xml_diff>
--- a/patterns.pptx
+++ b/patterns.pptx
@@ -6,10 +6,10 @@
     <p:sldMasterId id="2147483661" r:id="rId2"/>
   </p:sldMasterIdLst>
   <p:notesMasterIdLst>
-    <p:notesMasterId r:id="rId16"/>
+    <p:notesMasterId r:id="rId17"/>
   </p:notesMasterIdLst>
   <p:handoutMasterIdLst>
-    <p:handoutMasterId r:id="rId17"/>
+    <p:handoutMasterId r:id="rId18"/>
   </p:handoutMasterIdLst>
   <p:sldIdLst>
     <p:sldId id="256" r:id="rId3"/>
@@ -25,6 +25,7 @@
     <p:sldId id="266" r:id="rId13"/>
     <p:sldId id="267" r:id="rId14"/>
     <p:sldId id="268" r:id="rId15"/>
+    <p:sldId id="269" r:id="rId16"/>
   </p:sldIdLst>
   <p:sldSz cx="12192000" cy="6858000"/>
   <p:notesSz cx="9926638" cy="6797675"/>
@@ -141,6 +142,7 @@
             <p14:sldId id="266"/>
             <p14:sldId id="267"/>
             <p14:sldId id="268"/>
+            <p14:sldId id="269"/>
           </p14:sldIdLst>
         </p14:section>
       </p14:sectionLst>
@@ -234,7 +236,7 @@
           <a:p>
             <a:fld id="{D52430A0-EE55-46F9-9963-0047461BBCAC}" type="datetimeFigureOut">
               <a:rPr lang="ru-RU" smtClean="0"/>
-              <a:t>14.10.2018</a:t>
+              <a:t>03.10.2022</a:t>
             </a:fld>
             <a:endParaRPr lang="ru-RU"/>
           </a:p>
@@ -399,7 +401,7 @@
           <a:p>
             <a:fld id="{5EDA6115-4BBE-4A8B-AE49-E89E0E98B2FB}" type="datetimeFigureOut">
               <a:rPr lang="ru-RU" smtClean="0"/>
-              <a:t>14.10.2018</a:t>
+              <a:t>03.10.2022</a:t>
             </a:fld>
             <a:endParaRPr lang="ru-RU"/>
           </a:p>
@@ -882,7 +884,7 @@
           <a:p>
             <a:fld id="{1DDB6690-A2EB-4181-A89D-4DAB80F86AD6}" type="datetimeFigureOut">
               <a:rPr lang="ru-RU" smtClean="0"/>
-              <a:t>14.10.2018</a:t>
+              <a:t>03.10.2022</a:t>
             </a:fld>
             <a:endParaRPr lang="ru-RU"/>
           </a:p>
@@ -1059,7 +1061,7 @@
           <a:p>
             <a:fld id="{1DDB6690-A2EB-4181-A89D-4DAB80F86AD6}" type="datetimeFigureOut">
               <a:rPr lang="ru-RU" smtClean="0"/>
-              <a:t>14.10.2018</a:t>
+              <a:t>03.10.2022</a:t>
             </a:fld>
             <a:endParaRPr lang="ru-RU"/>
           </a:p>
@@ -1239,7 +1241,7 @@
           <a:p>
             <a:fld id="{1DDB6690-A2EB-4181-A89D-4DAB80F86AD6}" type="datetimeFigureOut">
               <a:rPr lang="ru-RU" smtClean="0"/>
-              <a:t>14.10.2018</a:t>
+              <a:t>03.10.2022</a:t>
             </a:fld>
             <a:endParaRPr lang="ru-RU"/>
           </a:p>
@@ -1449,7 +1451,7 @@
           <a:p>
             <a:fld id="{851CD819-C148-468A-A3CA-119B370BCC02}" type="datetimeFigureOut">
               <a:rPr lang="ru-RU" smtClean="0"/>
-              <a:t>14.10.2018</a:t>
+              <a:t>03.10.2022</a:t>
             </a:fld>
             <a:endParaRPr lang="ru-RU"/>
           </a:p>
@@ -1651,7 +1653,7 @@
           <a:p>
             <a:fld id="{851CD819-C148-468A-A3CA-119B370BCC02}" type="datetimeFigureOut">
               <a:rPr lang="ru-RU" smtClean="0"/>
-              <a:t>14.10.2018</a:t>
+              <a:t>03.10.2022</a:t>
             </a:fld>
             <a:endParaRPr lang="ru-RU"/>
           </a:p>
@@ -1924,7 +1926,7 @@
           <a:p>
             <a:fld id="{851CD819-C148-468A-A3CA-119B370BCC02}" type="datetimeFigureOut">
               <a:rPr lang="ru-RU" smtClean="0"/>
-              <a:t>14.10.2018</a:t>
+              <a:t>03.10.2022</a:t>
             </a:fld>
             <a:endParaRPr lang="ru-RU"/>
           </a:p>
@@ -2186,7 +2188,7 @@
           <a:p>
             <a:fld id="{851CD819-C148-468A-A3CA-119B370BCC02}" type="datetimeFigureOut">
               <a:rPr lang="ru-RU" smtClean="0"/>
-              <a:t>14.10.2018</a:t>
+              <a:t>03.10.2022</a:t>
             </a:fld>
             <a:endParaRPr lang="ru-RU"/>
           </a:p>
@@ -2589,7 +2591,7 @@
           <a:p>
             <a:fld id="{851CD819-C148-468A-A3CA-119B370BCC02}" type="datetimeFigureOut">
               <a:rPr lang="ru-RU" smtClean="0"/>
-              <a:t>14.10.2018</a:t>
+              <a:t>03.10.2022</a:t>
             </a:fld>
             <a:endParaRPr lang="ru-RU"/>
           </a:p>
@@ -2731,7 +2733,7 @@
           <a:p>
             <a:fld id="{851CD819-C148-468A-A3CA-119B370BCC02}" type="datetimeFigureOut">
               <a:rPr lang="ru-RU" smtClean="0"/>
-              <a:t>14.10.2018</a:t>
+              <a:t>03.10.2022</a:t>
             </a:fld>
             <a:endParaRPr lang="ru-RU"/>
           </a:p>
@@ -2857,7 +2859,7 @@
           <a:p>
             <a:fld id="{851CD819-C148-468A-A3CA-119B370BCC02}" type="datetimeFigureOut">
               <a:rPr lang="ru-RU" smtClean="0"/>
-              <a:t>14.10.2018</a:t>
+              <a:t>03.10.2022</a:t>
             </a:fld>
             <a:endParaRPr lang="ru-RU"/>
           </a:p>
@@ -3164,7 +3166,7 @@
           <a:p>
             <a:fld id="{851CD819-C148-468A-A3CA-119B370BCC02}" type="datetimeFigureOut">
               <a:rPr lang="ru-RU" smtClean="0"/>
-              <a:t>14.10.2018</a:t>
+              <a:t>03.10.2022</a:t>
             </a:fld>
             <a:endParaRPr lang="ru-RU"/>
           </a:p>
@@ -3350,7 +3352,7 @@
           <a:p>
             <a:fld id="{1DDB6690-A2EB-4181-A89D-4DAB80F86AD6}" type="datetimeFigureOut">
               <a:rPr lang="ru-RU" smtClean="0"/>
-              <a:t>14.10.2018</a:t>
+              <a:t>03.10.2022</a:t>
             </a:fld>
             <a:endParaRPr lang="ru-RU"/>
           </a:p>
@@ -3624,7 +3626,7 @@
           <a:p>
             <a:fld id="{851CD819-C148-468A-A3CA-119B370BCC02}" type="datetimeFigureOut">
               <a:rPr lang="ru-RU" smtClean="0"/>
-              <a:t>14.10.2018</a:t>
+              <a:t>03.10.2022</a:t>
             </a:fld>
             <a:endParaRPr lang="ru-RU"/>
           </a:p>
@@ -3826,7 +3828,7 @@
           <a:p>
             <a:fld id="{851CD819-C148-468A-A3CA-119B370BCC02}" type="datetimeFigureOut">
               <a:rPr lang="ru-RU" smtClean="0"/>
-              <a:t>14.10.2018</a:t>
+              <a:t>03.10.2022</a:t>
             </a:fld>
             <a:endParaRPr lang="ru-RU"/>
           </a:p>
@@ -4033,7 +4035,7 @@
           <a:p>
             <a:fld id="{851CD819-C148-468A-A3CA-119B370BCC02}" type="datetimeFigureOut">
               <a:rPr lang="ru-RU" smtClean="0"/>
-              <a:t>14.10.2018</a:t>
+              <a:t>03.10.2022</a:t>
             </a:fld>
             <a:endParaRPr lang="ru-RU"/>
           </a:p>
@@ -4295,7 +4297,7 @@
           <a:p>
             <a:fld id="{1DDB6690-A2EB-4181-A89D-4DAB80F86AD6}" type="datetimeFigureOut">
               <a:rPr lang="ru-RU" smtClean="0"/>
-              <a:t>14.10.2018</a:t>
+              <a:t>03.10.2022</a:t>
             </a:fld>
             <a:endParaRPr lang="ru-RU"/>
           </a:p>
@@ -4527,7 +4529,7 @@
           <a:p>
             <a:fld id="{1DDB6690-A2EB-4181-A89D-4DAB80F86AD6}" type="datetimeFigureOut">
               <a:rPr lang="ru-RU" smtClean="0"/>
-              <a:t>14.10.2018</a:t>
+              <a:t>03.10.2022</a:t>
             </a:fld>
             <a:endParaRPr lang="ru-RU"/>
           </a:p>
@@ -4894,7 +4896,7 @@
           <a:p>
             <a:fld id="{1DDB6690-A2EB-4181-A89D-4DAB80F86AD6}" type="datetimeFigureOut">
               <a:rPr lang="ru-RU" smtClean="0"/>
-              <a:t>14.10.2018</a:t>
+              <a:t>03.10.2022</a:t>
             </a:fld>
             <a:endParaRPr lang="ru-RU"/>
           </a:p>
@@ -5012,7 +5014,7 @@
           <a:p>
             <a:fld id="{1DDB6690-A2EB-4181-A89D-4DAB80F86AD6}" type="datetimeFigureOut">
               <a:rPr lang="ru-RU" smtClean="0"/>
-              <a:t>14.10.2018</a:t>
+              <a:t>03.10.2022</a:t>
             </a:fld>
             <a:endParaRPr lang="ru-RU"/>
           </a:p>
@@ -5107,7 +5109,7 @@
           <a:p>
             <a:fld id="{1DDB6690-A2EB-4181-A89D-4DAB80F86AD6}" type="datetimeFigureOut">
               <a:rPr lang="ru-RU" smtClean="0"/>
-              <a:t>14.10.2018</a:t>
+              <a:t>03.10.2022</a:t>
             </a:fld>
             <a:endParaRPr lang="ru-RU"/>
           </a:p>
@@ -5384,7 +5386,7 @@
           <a:p>
             <a:fld id="{1DDB6690-A2EB-4181-A89D-4DAB80F86AD6}" type="datetimeFigureOut">
               <a:rPr lang="ru-RU" smtClean="0"/>
-              <a:t>14.10.2018</a:t>
+              <a:t>03.10.2022</a:t>
             </a:fld>
             <a:endParaRPr lang="ru-RU"/>
           </a:p>
@@ -5637,7 +5639,7 @@
           <a:p>
             <a:fld id="{1DDB6690-A2EB-4181-A89D-4DAB80F86AD6}" type="datetimeFigureOut">
               <a:rPr lang="ru-RU" smtClean="0"/>
-              <a:t>14.10.2018</a:t>
+              <a:t>03.10.2022</a:t>
             </a:fld>
             <a:endParaRPr lang="ru-RU"/>
           </a:p>
@@ -5850,7 +5852,7 @@
           <a:p>
             <a:fld id="{1DDB6690-A2EB-4181-A89D-4DAB80F86AD6}" type="datetimeFigureOut">
               <a:rPr lang="ru-RU" smtClean="0"/>
-              <a:t>14.10.2018</a:t>
+              <a:t>03.10.2022</a:t>
             </a:fld>
             <a:endParaRPr lang="ru-RU"/>
           </a:p>
@@ -6645,11 +6647,7 @@
           <a:p>
             <a:r>
               <a:rPr lang="ru-RU" sz="2800" smtClean="0"/>
-              <a:t>1) </a:t>
-            </a:r>
-            <a:r>
-              <a:rPr lang="ru-RU" sz="2800" smtClean="0"/>
-              <a:t>Стратегия</a:t>
+              <a:t>1) Стратегия</a:t>
             </a:r>
             <a:r>
               <a:rPr lang="en-US" sz="2800" smtClean="0"/>
@@ -9175,19 +9173,11 @@
             </a:r>
             <a:r>
               <a:rPr lang="ru-RU" sz="2800" smtClean="0"/>
-              <a:t>) </a:t>
-            </a:r>
-            <a:r>
-              <a:rPr lang="ru-RU" sz="2800" smtClean="0"/>
-              <a:t>Компоновщик</a:t>
+              <a:t>) Компоновщик</a:t>
             </a:r>
             <a:r>
               <a:rPr lang="en-US" sz="2800" smtClean="0"/>
-              <a:t> </a:t>
-            </a:r>
-            <a:r>
-              <a:rPr lang="en-US" sz="2800" smtClean="0"/>
-              <a:t>Composite</a:t>
+              <a:t> Composite</a:t>
             </a:r>
             <a:endParaRPr lang="ru-RU" sz="2800"/>
           </a:p>
@@ -10267,11 +10257,7 @@
             </a:r>
             <a:r>
               <a:rPr lang="ru-RU" sz="2800" smtClean="0"/>
-              <a:t>) </a:t>
-            </a:r>
-            <a:r>
-              <a:rPr lang="ru-RU" sz="2800" smtClean="0"/>
-              <a:t>Состояние </a:t>
+              <a:t>) Состояние </a:t>
             </a:r>
             <a:r>
               <a:rPr lang="en-US" sz="2800" smtClean="0"/>
@@ -10348,11 +10334,7 @@
             </a:r>
             <a:r>
               <a:rPr lang="ru-RU" sz="1200"/>
-              <a:t>изменением </a:t>
-            </a:r>
-            <a:r>
-              <a:rPr lang="ru-RU" sz="1200"/>
-              <a:t>поведения </a:t>
+              <a:t>изменением поведения </a:t>
             </a:r>
             <a:r>
               <a:rPr lang="ru-RU" sz="1200" smtClean="0"/>
@@ -10360,11 +10342,7 @@
             </a:r>
             <a:r>
               <a:rPr lang="ru-RU" sz="1200"/>
-              <a:t>при изменении его внутреннего состояния</a:t>
-            </a:r>
-            <a:r>
-              <a:rPr lang="ru-RU" sz="1200"/>
-              <a:t>. </a:t>
+              <a:t>при изменении его внутреннего состояния. </a:t>
             </a:r>
             <a:r>
               <a:rPr lang="ru-RU" sz="1200" smtClean="0"/>
@@ -10629,22 +10607,14 @@
           <a:p>
             <a:r>
               <a:rPr lang="en-US" sz="1200" u="sng" smtClean="0"/>
-              <a:t>class </a:t>
-            </a:r>
-            <a:r>
-              <a:rPr lang="en-US" sz="1200" u="sng" smtClean="0"/>
-              <a:t>Context</a:t>
+              <a:t>class Context</a:t>
             </a:r>
             <a:endParaRPr lang="ru-RU" sz="1200" u="sng" smtClean="0"/>
           </a:p>
           <a:p>
             <a:r>
               <a:rPr lang="en-US" sz="1200" smtClean="0"/>
-              <a:t>request</a:t>
-            </a:r>
-            <a:r>
-              <a:rPr lang="en-US" sz="1200" smtClean="0"/>
-              <a:t>();</a:t>
+              <a:t>request();</a:t>
             </a:r>
           </a:p>
           <a:p>
@@ -11390,11 +11360,7 @@
             </a:r>
             <a:r>
               <a:rPr lang="ru-RU" sz="2800" smtClean="0"/>
-              <a:t>) </a:t>
-            </a:r>
-            <a:r>
-              <a:rPr lang="ru-RU" sz="2800" smtClean="0"/>
-              <a:t>Заместитель </a:t>
+              <a:t>) Заместитель </a:t>
             </a:r>
             <a:r>
               <a:rPr lang="en-US" sz="2800" smtClean="0"/>
@@ -11471,19 +11437,7 @@
             </a:r>
             <a:r>
               <a:rPr lang="ru-RU" sz="1200"/>
-              <a:t>объект, управляющий доступом </a:t>
-            </a:r>
-            <a:r>
-              <a:rPr lang="ru-RU" sz="1200"/>
-              <a:t>к </a:t>
-            </a:r>
-            <a:r>
-              <a:rPr lang="ru-RU" sz="1200"/>
-              <a:t>другому объекту. </a:t>
-            </a:r>
-            <a:r>
-              <a:rPr lang="ru-RU" sz="1200"/>
-              <a:t>Используйте </a:t>
+              <a:t>объект, управляющий доступом к другому объекту. Используйте </a:t>
             </a:r>
             <a:r>
               <a:rPr lang="ru-RU" sz="1200" smtClean="0"/>
@@ -11499,11 +11453,7 @@
             </a:r>
             <a:r>
               <a:rPr lang="ru-RU" sz="1200"/>
-              <a:t>и т</a:t>
-            </a:r>
-            <a:r>
-              <a:rPr lang="ru-RU" sz="1200"/>
-              <a:t>. </a:t>
+              <a:t>и т. </a:t>
             </a:r>
             <a:r>
               <a:rPr lang="ru-RU" sz="1200" smtClean="0"/>
@@ -11633,6 +11583,65 @@
       </p:par>
     </p:tnLst>
   </p:timing>
+</p:sld>
+</file>
+
+<file path=ppt/slides/slide14.xml><?xml version="1.0" encoding="utf-8"?>
+<p:sld xmlns:a="http://schemas.openxmlformats.org/drawingml/2006/main" xmlns:r="http://schemas.openxmlformats.org/officeDocument/2006/relationships" xmlns:p="http://schemas.openxmlformats.org/presentationml/2006/main">
+  <p:cSld>
+    <p:spTree>
+      <p:nvGrpSpPr>
+        <p:cNvPr id="1" name=""/>
+        <p:cNvGrpSpPr/>
+        <p:nvPr/>
+      </p:nvGrpSpPr>
+      <p:grpSpPr>
+        <a:xfrm>
+          <a:off x="0" y="0"/>
+          <a:ext cx="0" cy="0"/>
+          <a:chOff x="0" y="0"/>
+          <a:chExt cx="0" cy="0"/>
+        </a:xfrm>
+      </p:grpSpPr>
+      <p:sp>
+        <p:nvSpPr>
+          <p:cNvPr id="2" name="Заголовок 1"/>
+          <p:cNvSpPr>
+            <a:spLocks noGrp="1"/>
+          </p:cNvSpPr>
+          <p:nvPr>
+            <p:ph type="title"/>
+          </p:nvPr>
+        </p:nvSpPr>
+        <p:spPr>
+          <a:xfrm>
+            <a:off x="4228381" y="2280189"/>
+            <a:ext cx="2422585" cy="1325563"/>
+          </a:xfrm>
+        </p:spPr>
+        <p:txBody>
+          <a:bodyPr/>
+          <a:lstStyle/>
+          <a:p>
+            <a:pPr algn="ctr"/>
+            <a:r>
+              <a:rPr lang="en-US" smtClean="0"/>
+              <a:t>MVC</a:t>
+            </a:r>
+            <a:endParaRPr lang="ru-RU"/>
+          </a:p>
+        </p:txBody>
+      </p:sp>
+    </p:spTree>
+    <p:extLst>
+      <p:ext uri="{BB962C8B-B14F-4D97-AF65-F5344CB8AC3E}">
+        <p14:creationId xmlns:p14="http://schemas.microsoft.com/office/powerpoint/2010/main" val="4175566996"/>
+      </p:ext>
+    </p:extLst>
+  </p:cSld>
+  <p:clrMapOvr>
+    <a:masterClrMapping/>
+  </p:clrMapOvr>
 </p:sld>
 </file>
 

</xml_diff>